<commit_message>
new plots with "state score" - compare spatial & non-spatial nutrient uptake
</commit_message>
<xml_diff>
--- a/plant_state_score.pptx
+++ b/plant_state_score.pptx
@@ -6,6 +6,9 @@
   </p:sldMasterIdLst>
   <p:sldIdLst>
     <p:sldId id="256" r:id="rId2"/>
+    <p:sldId id="258" r:id="rId3"/>
+    <p:sldId id="259" r:id="rId4"/>
+    <p:sldId id="257" r:id="rId5"/>
   </p:sldIdLst>
   <p:sldSz cx="9144000" cy="6858000" type="screen4x3"/>
   <p:notesSz cx="6858000" cy="9144000"/>
@@ -288,7 +291,7 @@
           <a:p>
             <a:fld id="{842C7768-9DE3-4D22-A01C-68741EF221C6}" type="datetimeFigureOut">
               <a:rPr lang="en-US" smtClean="0"/>
-              <a:t>9/12/2014</a:t>
+              <a:t>9/13/2014</a:t>
             </a:fld>
             <a:endParaRPr lang="en-US"/>
           </a:p>
@@ -458,7 +461,7 @@
           <a:p>
             <a:fld id="{842C7768-9DE3-4D22-A01C-68741EF221C6}" type="datetimeFigureOut">
               <a:rPr lang="en-US" smtClean="0"/>
-              <a:t>9/12/2014</a:t>
+              <a:t>9/13/2014</a:t>
             </a:fld>
             <a:endParaRPr lang="en-US"/>
           </a:p>
@@ -638,7 +641,7 @@
           <a:p>
             <a:fld id="{842C7768-9DE3-4D22-A01C-68741EF221C6}" type="datetimeFigureOut">
               <a:rPr lang="en-US" smtClean="0"/>
-              <a:t>9/12/2014</a:t>
+              <a:t>9/13/2014</a:t>
             </a:fld>
             <a:endParaRPr lang="en-US"/>
           </a:p>
@@ -808,7 +811,7 @@
           <a:p>
             <a:fld id="{842C7768-9DE3-4D22-A01C-68741EF221C6}" type="datetimeFigureOut">
               <a:rPr lang="en-US" smtClean="0"/>
-              <a:t>9/12/2014</a:t>
+              <a:t>9/13/2014</a:t>
             </a:fld>
             <a:endParaRPr lang="en-US"/>
           </a:p>
@@ -1054,7 +1057,7 @@
           <a:p>
             <a:fld id="{842C7768-9DE3-4D22-A01C-68741EF221C6}" type="datetimeFigureOut">
               <a:rPr lang="en-US" smtClean="0"/>
-              <a:t>9/12/2014</a:t>
+              <a:t>9/13/2014</a:t>
             </a:fld>
             <a:endParaRPr lang="en-US"/>
           </a:p>
@@ -1342,7 +1345,7 @@
           <a:p>
             <a:fld id="{842C7768-9DE3-4D22-A01C-68741EF221C6}" type="datetimeFigureOut">
               <a:rPr lang="en-US" smtClean="0"/>
-              <a:t>9/12/2014</a:t>
+              <a:t>9/13/2014</a:t>
             </a:fld>
             <a:endParaRPr lang="en-US"/>
           </a:p>
@@ -1764,7 +1767,7 @@
           <a:p>
             <a:fld id="{842C7768-9DE3-4D22-A01C-68741EF221C6}" type="datetimeFigureOut">
               <a:rPr lang="en-US" smtClean="0"/>
-              <a:t>9/12/2014</a:t>
+              <a:t>9/13/2014</a:t>
             </a:fld>
             <a:endParaRPr lang="en-US"/>
           </a:p>
@@ -1882,7 +1885,7 @@
           <a:p>
             <a:fld id="{842C7768-9DE3-4D22-A01C-68741EF221C6}" type="datetimeFigureOut">
               <a:rPr lang="en-US" smtClean="0"/>
-              <a:t>9/12/2014</a:t>
+              <a:t>9/13/2014</a:t>
             </a:fld>
             <a:endParaRPr lang="en-US"/>
           </a:p>
@@ -1977,7 +1980,7 @@
           <a:p>
             <a:fld id="{842C7768-9DE3-4D22-A01C-68741EF221C6}" type="datetimeFigureOut">
               <a:rPr lang="en-US" smtClean="0"/>
-              <a:t>9/12/2014</a:t>
+              <a:t>9/13/2014</a:t>
             </a:fld>
             <a:endParaRPr lang="en-US"/>
           </a:p>
@@ -2254,7 +2257,7 @@
           <a:p>
             <a:fld id="{842C7768-9DE3-4D22-A01C-68741EF221C6}" type="datetimeFigureOut">
               <a:rPr lang="en-US" smtClean="0"/>
-              <a:t>9/12/2014</a:t>
+              <a:t>9/13/2014</a:t>
             </a:fld>
             <a:endParaRPr lang="en-US"/>
           </a:p>
@@ -2507,7 +2510,7 @@
           <a:p>
             <a:fld id="{842C7768-9DE3-4D22-A01C-68741EF221C6}" type="datetimeFigureOut">
               <a:rPr lang="en-US" smtClean="0"/>
-              <a:t>9/12/2014</a:t>
+              <a:t>9/13/2014</a:t>
             </a:fld>
             <a:endParaRPr lang="en-US"/>
           </a:p>
@@ -2720,7 +2723,7 @@
           <a:p>
             <a:fld id="{842C7768-9DE3-4D22-A01C-68741EF221C6}" type="datetimeFigureOut">
               <a:rPr lang="en-US" smtClean="0"/>
-              <a:t>9/12/2014</a:t>
+              <a:t>9/13/2014</a:t>
             </a:fld>
             <a:endParaRPr lang="en-US"/>
           </a:p>
@@ -3201,6 +3204,1043 @@
           </a:fontRef>
         </p:style>
       </p:cxnSp>
+      <p:sp>
+        <p:nvSpPr>
+          <p:cNvPr id="23" name="TextBox 22"/>
+          <p:cNvSpPr txBox="1"/>
+          <p:nvPr/>
+        </p:nvSpPr>
+        <p:spPr>
+          <a:xfrm>
+            <a:off x="1314450" y="257175"/>
+            <a:ext cx="685800" cy="369332"/>
+          </a:xfrm>
+          <a:prstGeom prst="rect">
+            <a:avLst/>
+          </a:prstGeom>
+          <a:noFill/>
+        </p:spPr>
+        <p:txBody>
+          <a:bodyPr wrap="square" rtlCol="0">
+            <a:spAutoFit/>
+          </a:bodyPr>
+          <a:lstStyle/>
+          <a:p>
+            <a:r>
+              <a:rPr lang="en-US" b="1" dirty="0" smtClean="0"/>
+              <a:t>100</a:t>
+            </a:r>
+            <a:endParaRPr lang="en-US" b="1" dirty="0"/>
+          </a:p>
+        </p:txBody>
+      </p:sp>
+      <p:sp>
+        <p:nvSpPr>
+          <p:cNvPr id="24" name="TextBox 23"/>
+          <p:cNvSpPr txBox="1"/>
+          <p:nvPr/>
+        </p:nvSpPr>
+        <p:spPr>
+          <a:xfrm>
+            <a:off x="1390650" y="2956441"/>
+            <a:ext cx="457200" cy="369332"/>
+          </a:xfrm>
+          <a:prstGeom prst="rect">
+            <a:avLst/>
+          </a:prstGeom>
+          <a:noFill/>
+        </p:spPr>
+        <p:txBody>
+          <a:bodyPr wrap="square" rtlCol="0">
+            <a:spAutoFit/>
+          </a:bodyPr>
+          <a:lstStyle/>
+          <a:p>
+            <a:r>
+              <a:rPr lang="en-US" b="1" dirty="0" smtClean="0"/>
+              <a:t>50</a:t>
+            </a:r>
+            <a:endParaRPr lang="en-US" b="1" dirty="0"/>
+          </a:p>
+        </p:txBody>
+      </p:sp>
+      <p:sp>
+        <p:nvSpPr>
+          <p:cNvPr id="25" name="TextBox 24"/>
+          <p:cNvSpPr txBox="1"/>
+          <p:nvPr/>
+        </p:nvSpPr>
+        <p:spPr>
+          <a:xfrm>
+            <a:off x="1543050" y="5821323"/>
+            <a:ext cx="457200" cy="369332"/>
+          </a:xfrm>
+          <a:prstGeom prst="rect">
+            <a:avLst/>
+          </a:prstGeom>
+          <a:noFill/>
+        </p:spPr>
+        <p:txBody>
+          <a:bodyPr wrap="square" rtlCol="0">
+            <a:spAutoFit/>
+          </a:bodyPr>
+          <a:lstStyle/>
+          <a:p>
+            <a:r>
+              <a:rPr lang="en-US" b="1" dirty="0" smtClean="0"/>
+              <a:t>0</a:t>
+            </a:r>
+            <a:endParaRPr lang="en-US" b="1" dirty="0"/>
+          </a:p>
+        </p:txBody>
+      </p:sp>
+      <p:sp>
+        <p:nvSpPr>
+          <p:cNvPr id="26" name="TextBox 25"/>
+          <p:cNvSpPr txBox="1"/>
+          <p:nvPr/>
+        </p:nvSpPr>
+        <p:spPr>
+          <a:xfrm>
+            <a:off x="4382233" y="5868948"/>
+            <a:ext cx="457200" cy="369332"/>
+          </a:xfrm>
+          <a:prstGeom prst="rect">
+            <a:avLst/>
+          </a:prstGeom>
+          <a:noFill/>
+        </p:spPr>
+        <p:txBody>
+          <a:bodyPr wrap="square" rtlCol="0">
+            <a:spAutoFit/>
+          </a:bodyPr>
+          <a:lstStyle/>
+          <a:p>
+            <a:r>
+              <a:rPr lang="en-US" b="1" dirty="0" smtClean="0"/>
+              <a:t>50</a:t>
+            </a:r>
+            <a:endParaRPr lang="en-US" b="1" dirty="0"/>
+          </a:p>
+        </p:txBody>
+      </p:sp>
+      <p:sp>
+        <p:nvSpPr>
+          <p:cNvPr id="27" name="TextBox 26"/>
+          <p:cNvSpPr txBox="1"/>
+          <p:nvPr/>
+        </p:nvSpPr>
+        <p:spPr>
+          <a:xfrm>
+            <a:off x="7181850" y="5884307"/>
+            <a:ext cx="685800" cy="369332"/>
+          </a:xfrm>
+          <a:prstGeom prst="rect">
+            <a:avLst/>
+          </a:prstGeom>
+          <a:noFill/>
+        </p:spPr>
+        <p:txBody>
+          <a:bodyPr wrap="square" rtlCol="0">
+            <a:spAutoFit/>
+          </a:bodyPr>
+          <a:lstStyle/>
+          <a:p>
+            <a:r>
+              <a:rPr lang="en-US" b="1" dirty="0" smtClean="0"/>
+              <a:t>100</a:t>
+            </a:r>
+            <a:endParaRPr lang="en-US" b="1" dirty="0"/>
+          </a:p>
+        </p:txBody>
+      </p:sp>
+      <p:sp>
+        <p:nvSpPr>
+          <p:cNvPr id="28" name="TextBox 27"/>
+          <p:cNvSpPr txBox="1"/>
+          <p:nvPr/>
+        </p:nvSpPr>
+        <p:spPr>
+          <a:xfrm>
+            <a:off x="7248525" y="152400"/>
+            <a:ext cx="1219200" cy="369332"/>
+          </a:xfrm>
+          <a:prstGeom prst="rect">
+            <a:avLst/>
+          </a:prstGeom>
+          <a:noFill/>
+        </p:spPr>
+        <p:txBody>
+          <a:bodyPr wrap="square" rtlCol="0">
+            <a:spAutoFit/>
+          </a:bodyPr>
+          <a:lstStyle/>
+          <a:p>
+            <a:r>
+              <a:rPr lang="en-US" b="1" dirty="0" smtClean="0"/>
+              <a:t>1:1</a:t>
+            </a:r>
+            <a:endParaRPr lang="en-US" b="1" dirty="0"/>
+          </a:p>
+        </p:txBody>
+      </p:sp>
+      <p:sp>
+        <p:nvSpPr>
+          <p:cNvPr id="31" name="TextBox 30"/>
+          <p:cNvSpPr txBox="1"/>
+          <p:nvPr/>
+        </p:nvSpPr>
+        <p:spPr>
+          <a:xfrm>
+            <a:off x="2000250" y="866775"/>
+            <a:ext cx="1371600" cy="369332"/>
+          </a:xfrm>
+          <a:prstGeom prst="rect">
+            <a:avLst/>
+          </a:prstGeom>
+          <a:noFill/>
+        </p:spPr>
+        <p:txBody>
+          <a:bodyPr wrap="square" rtlCol="0">
+            <a:spAutoFit/>
+          </a:bodyPr>
+          <a:lstStyle/>
+          <a:p>
+            <a:pPr algn="ctr"/>
+            <a:r>
+              <a:rPr lang="en-US" b="1" dirty="0" smtClean="0"/>
+              <a:t>FP State</a:t>
+            </a:r>
+            <a:endParaRPr lang="en-US" b="1" dirty="0"/>
+          </a:p>
+        </p:txBody>
+      </p:sp>
+      <p:sp>
+        <p:nvSpPr>
+          <p:cNvPr id="32" name="TextBox 31"/>
+          <p:cNvSpPr txBox="1"/>
+          <p:nvPr/>
+        </p:nvSpPr>
+        <p:spPr>
+          <a:xfrm>
+            <a:off x="5810250" y="4969907"/>
+            <a:ext cx="1371600" cy="369332"/>
+          </a:xfrm>
+          <a:prstGeom prst="rect">
+            <a:avLst/>
+          </a:prstGeom>
+          <a:noFill/>
+        </p:spPr>
+        <p:txBody>
+          <a:bodyPr wrap="square" rtlCol="0">
+            <a:spAutoFit/>
+          </a:bodyPr>
+          <a:lstStyle/>
+          <a:p>
+            <a:pPr algn="ctr"/>
+            <a:r>
+              <a:rPr lang="en-US" b="1" dirty="0" smtClean="0"/>
+              <a:t>SAV State</a:t>
+            </a:r>
+            <a:endParaRPr lang="en-US" b="1" dirty="0"/>
+          </a:p>
+        </p:txBody>
+      </p:sp>
+      <p:sp>
+        <p:nvSpPr>
+          <p:cNvPr id="33" name="TextBox 32"/>
+          <p:cNvSpPr txBox="1"/>
+          <p:nvPr/>
+        </p:nvSpPr>
+        <p:spPr>
+          <a:xfrm>
+            <a:off x="3905250" y="2950607"/>
+            <a:ext cx="1371600" cy="369332"/>
+          </a:xfrm>
+          <a:prstGeom prst="rect">
+            <a:avLst/>
+          </a:prstGeom>
+          <a:noFill/>
+        </p:spPr>
+        <p:txBody>
+          <a:bodyPr wrap="square" rtlCol="0">
+            <a:spAutoFit/>
+          </a:bodyPr>
+          <a:lstStyle/>
+          <a:p>
+            <a:pPr algn="ctr"/>
+            <a:r>
+              <a:rPr lang="en-US" b="1" dirty="0" smtClean="0"/>
+              <a:t>Mixed</a:t>
+            </a:r>
+            <a:endParaRPr lang="en-US" b="1" dirty="0"/>
+          </a:p>
+        </p:txBody>
+      </p:sp>
+      <p:sp>
+        <p:nvSpPr>
+          <p:cNvPr id="34" name="TextBox 33"/>
+          <p:cNvSpPr txBox="1"/>
+          <p:nvPr/>
+        </p:nvSpPr>
+        <p:spPr>
+          <a:xfrm rot="16200000">
+            <a:off x="-1627345" y="2944656"/>
+            <a:ext cx="5383823" cy="461665"/>
+          </a:xfrm>
+          <a:prstGeom prst="rect">
+            <a:avLst/>
+          </a:prstGeom>
+          <a:noFill/>
+        </p:spPr>
+        <p:txBody>
+          <a:bodyPr wrap="square" rtlCol="0">
+            <a:spAutoFit/>
+          </a:bodyPr>
+          <a:lstStyle/>
+          <a:p>
+            <a:pPr algn="ctr"/>
+            <a:r>
+              <a:rPr lang="en-US" sz="2400" b="1" dirty="0" smtClean="0"/>
+              <a:t>Floating plant cover (%)</a:t>
+            </a:r>
+            <a:endParaRPr lang="en-US" sz="2400" b="1" dirty="0"/>
+          </a:p>
+        </p:txBody>
+      </p:sp>
+      <p:sp>
+        <p:nvSpPr>
+          <p:cNvPr id="36" name="TextBox 35"/>
+          <p:cNvSpPr txBox="1"/>
+          <p:nvPr/>
+        </p:nvSpPr>
+        <p:spPr>
+          <a:xfrm>
+            <a:off x="1883752" y="6253639"/>
+            <a:ext cx="5383823" cy="461665"/>
+          </a:xfrm>
+          <a:prstGeom prst="rect">
+            <a:avLst/>
+          </a:prstGeom>
+          <a:noFill/>
+        </p:spPr>
+        <p:txBody>
+          <a:bodyPr wrap="square" rtlCol="0">
+            <a:spAutoFit/>
+          </a:bodyPr>
+          <a:lstStyle/>
+          <a:p>
+            <a:pPr algn="ctr"/>
+            <a:r>
+              <a:rPr lang="en-US" sz="2400" b="1" smtClean="0"/>
+              <a:t>Submerged plant </a:t>
+            </a:r>
+            <a:r>
+              <a:rPr lang="en-US" sz="2400" b="1" dirty="0" smtClean="0"/>
+              <a:t>cover (%)</a:t>
+            </a:r>
+            <a:endParaRPr lang="en-US" sz="2400" b="1" dirty="0"/>
+          </a:p>
+        </p:txBody>
+      </p:sp>
+    </p:spTree>
+    <p:extLst>
+      <p:ext uri="{BB962C8B-B14F-4D97-AF65-F5344CB8AC3E}">
+        <p14:creationId xmlns:p14="http://schemas.microsoft.com/office/powerpoint/2010/main" val="3256233058"/>
+      </p:ext>
+    </p:extLst>
+  </p:cSld>
+  <p:clrMapOvr>
+    <a:masterClrMapping/>
+  </p:clrMapOvr>
+  <p:timing>
+    <p:tnLst>
+      <p:par>
+        <p:cTn id="1" dur="indefinite" restart="never" nodeType="tmRoot"/>
+      </p:par>
+    </p:tnLst>
+  </p:timing>
+</p:sld>
+</file>
+
+<file path=ppt/slides/slide2.xml><?xml version="1.0" encoding="utf-8"?>
+<p:sld xmlns:a="http://schemas.openxmlformats.org/drawingml/2006/main" xmlns:r="http://schemas.openxmlformats.org/officeDocument/2006/relationships" xmlns:p="http://schemas.openxmlformats.org/presentationml/2006/main">
+  <p:cSld>
+    <p:spTree>
+      <p:nvGrpSpPr>
+        <p:cNvPr id="1" name=""/>
+        <p:cNvGrpSpPr/>
+        <p:nvPr/>
+      </p:nvGrpSpPr>
+      <p:grpSpPr>
+        <a:xfrm>
+          <a:off x="0" y="0"/>
+          <a:ext cx="0" cy="0"/>
+          <a:chOff x="0" y="0"/>
+          <a:chExt cx="0" cy="0"/>
+        </a:xfrm>
+      </p:grpSpPr>
+      <p:cxnSp>
+        <p:nvCxnSpPr>
+          <p:cNvPr id="7" name="Straight Connector 6"/>
+          <p:cNvCxnSpPr/>
+          <p:nvPr/>
+        </p:nvCxnSpPr>
+        <p:spPr>
+          <a:xfrm>
+            <a:off x="1830266" y="397907"/>
+            <a:ext cx="17584" cy="5486400"/>
+          </a:xfrm>
+          <a:prstGeom prst="line">
+            <a:avLst/>
+          </a:prstGeom>
+          <a:ln w="38100">
+            <a:solidFill>
+              <a:schemeClr val="tx1"/>
+            </a:solidFill>
+          </a:ln>
+        </p:spPr>
+        <p:style>
+          <a:lnRef idx="1">
+            <a:schemeClr val="accent1"/>
+          </a:lnRef>
+          <a:fillRef idx="0">
+            <a:schemeClr val="accent1"/>
+          </a:fillRef>
+          <a:effectRef idx="0">
+            <a:schemeClr val="accent1"/>
+          </a:effectRef>
+          <a:fontRef idx="minor">
+            <a:schemeClr val="tx1"/>
+          </a:fontRef>
+        </p:style>
+      </p:cxnSp>
+      <p:cxnSp>
+        <p:nvCxnSpPr>
+          <p:cNvPr id="9" name="Straight Connector 8"/>
+          <p:cNvCxnSpPr/>
+          <p:nvPr/>
+        </p:nvCxnSpPr>
+        <p:spPr>
+          <a:xfrm flipH="1">
+            <a:off x="1830266" y="5884307"/>
+            <a:ext cx="5503984" cy="0"/>
+          </a:xfrm>
+          <a:prstGeom prst="line">
+            <a:avLst/>
+          </a:prstGeom>
+          <a:ln w="38100">
+            <a:solidFill>
+              <a:schemeClr val="tx1"/>
+            </a:solidFill>
+          </a:ln>
+        </p:spPr>
+        <p:style>
+          <a:lnRef idx="1">
+            <a:schemeClr val="accent1"/>
+          </a:lnRef>
+          <a:fillRef idx="0">
+            <a:schemeClr val="accent1"/>
+          </a:fillRef>
+          <a:effectRef idx="0">
+            <a:schemeClr val="accent1"/>
+          </a:effectRef>
+          <a:fontRef idx="minor">
+            <a:schemeClr val="tx1"/>
+          </a:fontRef>
+        </p:style>
+      </p:cxnSp>
+      <p:cxnSp>
+        <p:nvCxnSpPr>
+          <p:cNvPr id="14" name="Straight Connector 13"/>
+          <p:cNvCxnSpPr/>
+          <p:nvPr/>
+        </p:nvCxnSpPr>
+        <p:spPr>
+          <a:xfrm flipV="1">
+            <a:off x="1830266" y="397907"/>
+            <a:ext cx="5503984" cy="5486400"/>
+          </a:xfrm>
+          <a:prstGeom prst="line">
+            <a:avLst/>
+          </a:prstGeom>
+          <a:ln w="31750">
+            <a:solidFill>
+              <a:schemeClr val="tx1"/>
+            </a:solidFill>
+            <a:prstDash val="dash"/>
+          </a:ln>
+        </p:spPr>
+        <p:style>
+          <a:lnRef idx="1">
+            <a:schemeClr val="accent1"/>
+          </a:lnRef>
+          <a:fillRef idx="0">
+            <a:schemeClr val="accent1"/>
+          </a:fillRef>
+          <a:effectRef idx="0">
+            <a:schemeClr val="accent1"/>
+          </a:effectRef>
+          <a:fontRef idx="minor">
+            <a:schemeClr val="tx1"/>
+          </a:fontRef>
+        </p:style>
+      </p:cxnSp>
+      <p:sp>
+        <p:nvSpPr>
+          <p:cNvPr id="23" name="TextBox 22"/>
+          <p:cNvSpPr txBox="1"/>
+          <p:nvPr/>
+        </p:nvSpPr>
+        <p:spPr>
+          <a:xfrm>
+            <a:off x="1314450" y="257175"/>
+            <a:ext cx="685800" cy="369332"/>
+          </a:xfrm>
+          <a:prstGeom prst="rect">
+            <a:avLst/>
+          </a:prstGeom>
+          <a:noFill/>
+        </p:spPr>
+        <p:txBody>
+          <a:bodyPr wrap="square" rtlCol="0">
+            <a:spAutoFit/>
+          </a:bodyPr>
+          <a:lstStyle/>
+          <a:p>
+            <a:r>
+              <a:rPr lang="en-US" b="1" dirty="0" smtClean="0"/>
+              <a:t>100</a:t>
+            </a:r>
+            <a:endParaRPr lang="en-US" b="1" dirty="0"/>
+          </a:p>
+        </p:txBody>
+      </p:sp>
+      <p:sp>
+        <p:nvSpPr>
+          <p:cNvPr id="24" name="TextBox 23"/>
+          <p:cNvSpPr txBox="1"/>
+          <p:nvPr/>
+        </p:nvSpPr>
+        <p:spPr>
+          <a:xfrm>
+            <a:off x="1390650" y="2956441"/>
+            <a:ext cx="457200" cy="369332"/>
+          </a:xfrm>
+          <a:prstGeom prst="rect">
+            <a:avLst/>
+          </a:prstGeom>
+          <a:noFill/>
+        </p:spPr>
+        <p:txBody>
+          <a:bodyPr wrap="square" rtlCol="0">
+            <a:spAutoFit/>
+          </a:bodyPr>
+          <a:lstStyle/>
+          <a:p>
+            <a:r>
+              <a:rPr lang="en-US" b="1" dirty="0" smtClean="0"/>
+              <a:t>50</a:t>
+            </a:r>
+            <a:endParaRPr lang="en-US" b="1" dirty="0"/>
+          </a:p>
+        </p:txBody>
+      </p:sp>
+      <p:sp>
+        <p:nvSpPr>
+          <p:cNvPr id="25" name="TextBox 24"/>
+          <p:cNvSpPr txBox="1"/>
+          <p:nvPr/>
+        </p:nvSpPr>
+        <p:spPr>
+          <a:xfrm>
+            <a:off x="1543050" y="5821323"/>
+            <a:ext cx="457200" cy="369332"/>
+          </a:xfrm>
+          <a:prstGeom prst="rect">
+            <a:avLst/>
+          </a:prstGeom>
+          <a:noFill/>
+        </p:spPr>
+        <p:txBody>
+          <a:bodyPr wrap="square" rtlCol="0">
+            <a:spAutoFit/>
+          </a:bodyPr>
+          <a:lstStyle/>
+          <a:p>
+            <a:r>
+              <a:rPr lang="en-US" b="1" dirty="0" smtClean="0"/>
+              <a:t>0</a:t>
+            </a:r>
+            <a:endParaRPr lang="en-US" b="1" dirty="0"/>
+          </a:p>
+        </p:txBody>
+      </p:sp>
+      <p:sp>
+        <p:nvSpPr>
+          <p:cNvPr id="26" name="TextBox 25"/>
+          <p:cNvSpPr txBox="1"/>
+          <p:nvPr/>
+        </p:nvSpPr>
+        <p:spPr>
+          <a:xfrm>
+            <a:off x="4382233" y="5868948"/>
+            <a:ext cx="457200" cy="369332"/>
+          </a:xfrm>
+          <a:prstGeom prst="rect">
+            <a:avLst/>
+          </a:prstGeom>
+          <a:noFill/>
+        </p:spPr>
+        <p:txBody>
+          <a:bodyPr wrap="square" rtlCol="0">
+            <a:spAutoFit/>
+          </a:bodyPr>
+          <a:lstStyle/>
+          <a:p>
+            <a:r>
+              <a:rPr lang="en-US" b="1" dirty="0" smtClean="0"/>
+              <a:t>50</a:t>
+            </a:r>
+            <a:endParaRPr lang="en-US" b="1" dirty="0"/>
+          </a:p>
+        </p:txBody>
+      </p:sp>
+      <p:sp>
+        <p:nvSpPr>
+          <p:cNvPr id="27" name="TextBox 26"/>
+          <p:cNvSpPr txBox="1"/>
+          <p:nvPr/>
+        </p:nvSpPr>
+        <p:spPr>
+          <a:xfrm>
+            <a:off x="7181850" y="5884307"/>
+            <a:ext cx="685800" cy="369332"/>
+          </a:xfrm>
+          <a:prstGeom prst="rect">
+            <a:avLst/>
+          </a:prstGeom>
+          <a:noFill/>
+        </p:spPr>
+        <p:txBody>
+          <a:bodyPr wrap="square" rtlCol="0">
+            <a:spAutoFit/>
+          </a:bodyPr>
+          <a:lstStyle/>
+          <a:p>
+            <a:r>
+              <a:rPr lang="en-US" b="1" dirty="0" smtClean="0"/>
+              <a:t>100</a:t>
+            </a:r>
+            <a:endParaRPr lang="en-US" b="1" dirty="0"/>
+          </a:p>
+        </p:txBody>
+      </p:sp>
+      <p:sp>
+        <p:nvSpPr>
+          <p:cNvPr id="28" name="TextBox 27"/>
+          <p:cNvSpPr txBox="1"/>
+          <p:nvPr/>
+        </p:nvSpPr>
+        <p:spPr>
+          <a:xfrm>
+            <a:off x="7248525" y="152400"/>
+            <a:ext cx="1219200" cy="369332"/>
+          </a:xfrm>
+          <a:prstGeom prst="rect">
+            <a:avLst/>
+          </a:prstGeom>
+          <a:noFill/>
+        </p:spPr>
+        <p:txBody>
+          <a:bodyPr wrap="square" rtlCol="0">
+            <a:spAutoFit/>
+          </a:bodyPr>
+          <a:lstStyle/>
+          <a:p>
+            <a:r>
+              <a:rPr lang="en-US" b="1" dirty="0" smtClean="0"/>
+              <a:t>1:1</a:t>
+            </a:r>
+            <a:endParaRPr lang="en-US" b="1" dirty="0"/>
+          </a:p>
+        </p:txBody>
+      </p:sp>
+      <p:sp>
+        <p:nvSpPr>
+          <p:cNvPr id="34" name="TextBox 33"/>
+          <p:cNvSpPr txBox="1"/>
+          <p:nvPr/>
+        </p:nvSpPr>
+        <p:spPr>
+          <a:xfrm rot="16200000">
+            <a:off x="-1627345" y="2944656"/>
+            <a:ext cx="5383823" cy="461665"/>
+          </a:xfrm>
+          <a:prstGeom prst="rect">
+            <a:avLst/>
+          </a:prstGeom>
+          <a:noFill/>
+        </p:spPr>
+        <p:txBody>
+          <a:bodyPr wrap="square" rtlCol="0">
+            <a:spAutoFit/>
+          </a:bodyPr>
+          <a:lstStyle/>
+          <a:p>
+            <a:pPr algn="ctr"/>
+            <a:r>
+              <a:rPr lang="en-US" sz="2400" b="1" dirty="0" smtClean="0"/>
+              <a:t>Floating plant cover (%)</a:t>
+            </a:r>
+            <a:endParaRPr lang="en-US" sz="2400" b="1" dirty="0"/>
+          </a:p>
+        </p:txBody>
+      </p:sp>
+      <p:sp>
+        <p:nvSpPr>
+          <p:cNvPr id="36" name="TextBox 35"/>
+          <p:cNvSpPr txBox="1"/>
+          <p:nvPr/>
+        </p:nvSpPr>
+        <p:spPr>
+          <a:xfrm>
+            <a:off x="1883752" y="6253639"/>
+            <a:ext cx="5383823" cy="461665"/>
+          </a:xfrm>
+          <a:prstGeom prst="rect">
+            <a:avLst/>
+          </a:prstGeom>
+          <a:noFill/>
+        </p:spPr>
+        <p:txBody>
+          <a:bodyPr wrap="square" rtlCol="0">
+            <a:spAutoFit/>
+          </a:bodyPr>
+          <a:lstStyle/>
+          <a:p>
+            <a:pPr algn="ctr"/>
+            <a:r>
+              <a:rPr lang="en-US" sz="2400" b="1" smtClean="0"/>
+              <a:t>Submerged plant </a:t>
+            </a:r>
+            <a:r>
+              <a:rPr lang="en-US" sz="2400" b="1" dirty="0" smtClean="0"/>
+              <a:t>cover (%)</a:t>
+            </a:r>
+            <a:endParaRPr lang="en-US" sz="2400" b="1" dirty="0"/>
+          </a:p>
+        </p:txBody>
+      </p:sp>
+      <p:sp>
+        <p:nvSpPr>
+          <p:cNvPr id="17" name="Oval 16"/>
+          <p:cNvSpPr/>
+          <p:nvPr/>
+        </p:nvSpPr>
+        <p:spPr>
+          <a:xfrm>
+            <a:off x="2819400" y="1295400"/>
+            <a:ext cx="152400" cy="152400"/>
+          </a:xfrm>
+          <a:prstGeom prst="ellipse">
+            <a:avLst/>
+          </a:prstGeom>
+        </p:spPr>
+        <p:style>
+          <a:lnRef idx="2">
+            <a:schemeClr val="accent1">
+              <a:shade val="50000"/>
+            </a:schemeClr>
+          </a:lnRef>
+          <a:fillRef idx="1">
+            <a:schemeClr val="accent1"/>
+          </a:fillRef>
+          <a:effectRef idx="0">
+            <a:schemeClr val="accent1"/>
+          </a:effectRef>
+          <a:fontRef idx="minor">
+            <a:schemeClr val="lt1"/>
+          </a:fontRef>
+        </p:style>
+        <p:txBody>
+          <a:bodyPr rtlCol="0" anchor="ctr"/>
+          <a:lstStyle/>
+          <a:p>
+            <a:pPr algn="ctr"/>
+            <a:endParaRPr lang="en-US"/>
+          </a:p>
+        </p:txBody>
+      </p:sp>
+      <p:cxnSp>
+        <p:nvCxnSpPr>
+          <p:cNvPr id="4" name="Straight Connector 3"/>
+          <p:cNvCxnSpPr/>
+          <p:nvPr/>
+        </p:nvCxnSpPr>
+        <p:spPr>
+          <a:xfrm>
+            <a:off x="2971800" y="1447800"/>
+            <a:ext cx="1600200" cy="1693307"/>
+          </a:xfrm>
+          <a:prstGeom prst="line">
+            <a:avLst/>
+          </a:prstGeom>
+          <a:ln w="25400"/>
+        </p:spPr>
+        <p:style>
+          <a:lnRef idx="1">
+            <a:schemeClr val="accent1"/>
+          </a:lnRef>
+          <a:fillRef idx="0">
+            <a:schemeClr val="accent1"/>
+          </a:fillRef>
+          <a:effectRef idx="0">
+            <a:schemeClr val="accent1"/>
+          </a:effectRef>
+          <a:fontRef idx="minor">
+            <a:schemeClr val="tx1"/>
+          </a:fontRef>
+        </p:style>
+      </p:cxnSp>
+      <p:sp>
+        <p:nvSpPr>
+          <p:cNvPr id="6" name="TextBox 5"/>
+          <p:cNvSpPr txBox="1"/>
+          <p:nvPr/>
+        </p:nvSpPr>
+        <p:spPr>
+          <a:xfrm>
+            <a:off x="3505933" y="1334869"/>
+            <a:ext cx="2209067" cy="646331"/>
+          </a:xfrm>
+          <a:prstGeom prst="rect">
+            <a:avLst/>
+          </a:prstGeom>
+          <a:noFill/>
+        </p:spPr>
+        <p:txBody>
+          <a:bodyPr wrap="square" rtlCol="0">
+            <a:spAutoFit/>
+          </a:bodyPr>
+          <a:lstStyle/>
+          <a:p>
+            <a:r>
+              <a:rPr lang="en-US" b="1" dirty="0" smtClean="0"/>
+              <a:t>Distance</a:t>
+            </a:r>
+            <a:r>
+              <a:rPr lang="en-US" dirty="0" smtClean="0"/>
+              <a:t> </a:t>
+            </a:r>
+            <a:r>
+              <a:rPr lang="en-US" b="1" dirty="0" smtClean="0"/>
+              <a:t>=</a:t>
+            </a:r>
+            <a:r>
+              <a:rPr lang="en-US" dirty="0" smtClean="0"/>
+              <a:t> </a:t>
+            </a:r>
+          </a:p>
+          <a:p>
+            <a:r>
+              <a:rPr lang="en-US" dirty="0" smtClean="0"/>
+              <a:t>(FP – SAV) / </a:t>
+            </a:r>
+            <a:r>
+              <a:rPr lang="en-US" dirty="0" err="1" smtClean="0"/>
+              <a:t>sqrt</a:t>
+            </a:r>
+            <a:r>
+              <a:rPr lang="en-US" dirty="0" smtClean="0"/>
+              <a:t>(2)</a:t>
+            </a:r>
+            <a:endParaRPr lang="en-US" dirty="0"/>
+          </a:p>
+        </p:txBody>
+      </p:sp>
+      <p:sp>
+        <p:nvSpPr>
+          <p:cNvPr id="8" name="TextBox 7"/>
+          <p:cNvSpPr txBox="1"/>
+          <p:nvPr/>
+        </p:nvSpPr>
+        <p:spPr>
+          <a:xfrm>
+            <a:off x="3200400" y="914400"/>
+            <a:ext cx="2743200" cy="461665"/>
+          </a:xfrm>
+          <a:prstGeom prst="rect">
+            <a:avLst/>
+          </a:prstGeom>
+          <a:noFill/>
+        </p:spPr>
+        <p:txBody>
+          <a:bodyPr wrap="square" rtlCol="0">
+            <a:spAutoFit/>
+          </a:bodyPr>
+          <a:lstStyle/>
+          <a:p>
+            <a:pPr algn="ctr"/>
+            <a:r>
+              <a:rPr lang="en-US" sz="2400" b="1" dirty="0" smtClean="0">
+                <a:solidFill>
+                  <a:srgbClr val="FF0000"/>
+                </a:solidFill>
+              </a:rPr>
+              <a:t>Plant State Score</a:t>
+            </a:r>
+            <a:endParaRPr lang="en-US" sz="2400" b="1" dirty="0">
+              <a:solidFill>
+                <a:srgbClr val="FF0000"/>
+              </a:solidFill>
+            </a:endParaRPr>
+          </a:p>
+        </p:txBody>
+      </p:sp>
+    </p:spTree>
+    <p:extLst>
+      <p:ext uri="{BB962C8B-B14F-4D97-AF65-F5344CB8AC3E}">
+        <p14:creationId xmlns:p14="http://schemas.microsoft.com/office/powerpoint/2010/main" val="3861318700"/>
+      </p:ext>
+    </p:extLst>
+  </p:cSld>
+  <p:clrMapOvr>
+    <a:masterClrMapping/>
+  </p:clrMapOvr>
+  <p:timing>
+    <p:tnLst>
+      <p:par>
+        <p:cTn id="1" dur="indefinite" restart="never" nodeType="tmRoot"/>
+      </p:par>
+    </p:tnLst>
+  </p:timing>
+</p:sld>
+</file>
+
+<file path=ppt/slides/slide3.xml><?xml version="1.0" encoding="utf-8"?>
+<p:sld xmlns:a="http://schemas.openxmlformats.org/drawingml/2006/main" xmlns:r="http://schemas.openxmlformats.org/officeDocument/2006/relationships" xmlns:p="http://schemas.openxmlformats.org/presentationml/2006/main">
+  <p:cSld>
+    <p:spTree>
+      <p:nvGrpSpPr>
+        <p:cNvPr id="1" name=""/>
+        <p:cNvGrpSpPr/>
+        <p:nvPr/>
+      </p:nvGrpSpPr>
+      <p:grpSpPr>
+        <a:xfrm>
+          <a:off x="0" y="0"/>
+          <a:ext cx="0" cy="0"/>
+          <a:chOff x="0" y="0"/>
+          <a:chExt cx="0" cy="0"/>
+        </a:xfrm>
+      </p:grpSpPr>
+      <p:cxnSp>
+        <p:nvCxnSpPr>
+          <p:cNvPr id="7" name="Straight Connector 6"/>
+          <p:cNvCxnSpPr/>
+          <p:nvPr/>
+        </p:nvCxnSpPr>
+        <p:spPr>
+          <a:xfrm>
+            <a:off x="1830266" y="397907"/>
+            <a:ext cx="17584" cy="5486400"/>
+          </a:xfrm>
+          <a:prstGeom prst="line">
+            <a:avLst/>
+          </a:prstGeom>
+          <a:ln w="38100">
+            <a:solidFill>
+              <a:schemeClr val="tx1"/>
+            </a:solidFill>
+          </a:ln>
+        </p:spPr>
+        <p:style>
+          <a:lnRef idx="1">
+            <a:schemeClr val="accent1"/>
+          </a:lnRef>
+          <a:fillRef idx="0">
+            <a:schemeClr val="accent1"/>
+          </a:fillRef>
+          <a:effectRef idx="0">
+            <a:schemeClr val="accent1"/>
+          </a:effectRef>
+          <a:fontRef idx="minor">
+            <a:schemeClr val="tx1"/>
+          </a:fontRef>
+        </p:style>
+      </p:cxnSp>
+      <p:cxnSp>
+        <p:nvCxnSpPr>
+          <p:cNvPr id="9" name="Straight Connector 8"/>
+          <p:cNvCxnSpPr/>
+          <p:nvPr/>
+        </p:nvCxnSpPr>
+        <p:spPr>
+          <a:xfrm flipH="1">
+            <a:off x="1830266" y="5884307"/>
+            <a:ext cx="5503984" cy="0"/>
+          </a:xfrm>
+          <a:prstGeom prst="line">
+            <a:avLst/>
+          </a:prstGeom>
+          <a:ln w="38100">
+            <a:solidFill>
+              <a:schemeClr val="tx1"/>
+            </a:solidFill>
+          </a:ln>
+        </p:spPr>
+        <p:style>
+          <a:lnRef idx="1">
+            <a:schemeClr val="accent1"/>
+          </a:lnRef>
+          <a:fillRef idx="0">
+            <a:schemeClr val="accent1"/>
+          </a:fillRef>
+          <a:effectRef idx="0">
+            <a:schemeClr val="accent1"/>
+          </a:effectRef>
+          <a:fontRef idx="minor">
+            <a:schemeClr val="tx1"/>
+          </a:fontRef>
+        </p:style>
+      </p:cxnSp>
+      <p:cxnSp>
+        <p:nvCxnSpPr>
+          <p:cNvPr id="14" name="Straight Connector 13"/>
+          <p:cNvCxnSpPr/>
+          <p:nvPr/>
+        </p:nvCxnSpPr>
+        <p:spPr>
+          <a:xfrm flipV="1">
+            <a:off x="1830266" y="397907"/>
+            <a:ext cx="5503984" cy="5486400"/>
+          </a:xfrm>
+          <a:prstGeom prst="line">
+            <a:avLst/>
+          </a:prstGeom>
+          <a:ln w="31750">
+            <a:solidFill>
+              <a:schemeClr val="tx1"/>
+            </a:solidFill>
+            <a:prstDash val="dash"/>
+          </a:ln>
+        </p:spPr>
+        <p:style>
+          <a:lnRef idx="1">
+            <a:schemeClr val="accent1"/>
+          </a:lnRef>
+          <a:fillRef idx="0">
+            <a:schemeClr val="accent1"/>
+          </a:fillRef>
+          <a:effectRef idx="0">
+            <a:schemeClr val="accent1"/>
+          </a:effectRef>
+          <a:fontRef idx="minor">
+            <a:schemeClr val="tx1"/>
+          </a:fontRef>
+        </p:style>
+      </p:cxnSp>
       <p:cxnSp>
         <p:nvCxnSpPr>
           <p:cNvPr id="19" name="Straight Connector 18"/>
@@ -3715,13 +4755,743 @@
     </p:spTree>
     <p:extLst>
       <p:ext uri="{BB962C8B-B14F-4D97-AF65-F5344CB8AC3E}">
-        <p14:creationId xmlns:p14="http://schemas.microsoft.com/office/powerpoint/2010/main" val="3256233058"/>
+        <p14:creationId xmlns:p14="http://schemas.microsoft.com/office/powerpoint/2010/main" val="1856795068"/>
       </p:ext>
     </p:extLst>
   </p:cSld>
   <p:clrMapOvr>
     <a:masterClrMapping/>
   </p:clrMapOvr>
+  <p:timing>
+    <p:tnLst>
+      <p:par>
+        <p:cTn id="1" dur="indefinite" restart="never" nodeType="tmRoot"/>
+      </p:par>
+    </p:tnLst>
+  </p:timing>
+</p:sld>
+</file>
+
+<file path=ppt/slides/slide4.xml><?xml version="1.0" encoding="utf-8"?>
+<p:sld xmlns:a="http://schemas.openxmlformats.org/drawingml/2006/main" xmlns:r="http://schemas.openxmlformats.org/officeDocument/2006/relationships" xmlns:p="http://schemas.openxmlformats.org/presentationml/2006/main">
+  <p:cSld>
+    <p:spTree>
+      <p:nvGrpSpPr>
+        <p:cNvPr id="1" name=""/>
+        <p:cNvGrpSpPr/>
+        <p:nvPr/>
+      </p:nvGrpSpPr>
+      <p:grpSpPr>
+        <a:xfrm>
+          <a:off x="0" y="0"/>
+          <a:ext cx="0" cy="0"/>
+          <a:chOff x="0" y="0"/>
+          <a:chExt cx="0" cy="0"/>
+        </a:xfrm>
+      </p:grpSpPr>
+      <p:cxnSp>
+        <p:nvCxnSpPr>
+          <p:cNvPr id="7" name="Straight Connector 6"/>
+          <p:cNvCxnSpPr/>
+          <p:nvPr/>
+        </p:nvCxnSpPr>
+        <p:spPr>
+          <a:xfrm>
+            <a:off x="1830266" y="397907"/>
+            <a:ext cx="17584" cy="5486400"/>
+          </a:xfrm>
+          <a:prstGeom prst="line">
+            <a:avLst/>
+          </a:prstGeom>
+          <a:ln w="38100">
+            <a:solidFill>
+              <a:schemeClr val="tx1"/>
+            </a:solidFill>
+          </a:ln>
+        </p:spPr>
+        <p:style>
+          <a:lnRef idx="1">
+            <a:schemeClr val="accent1"/>
+          </a:lnRef>
+          <a:fillRef idx="0">
+            <a:schemeClr val="accent1"/>
+          </a:fillRef>
+          <a:effectRef idx="0">
+            <a:schemeClr val="accent1"/>
+          </a:effectRef>
+          <a:fontRef idx="minor">
+            <a:schemeClr val="tx1"/>
+          </a:fontRef>
+        </p:style>
+      </p:cxnSp>
+      <p:cxnSp>
+        <p:nvCxnSpPr>
+          <p:cNvPr id="9" name="Straight Connector 8"/>
+          <p:cNvCxnSpPr/>
+          <p:nvPr/>
+        </p:nvCxnSpPr>
+        <p:spPr>
+          <a:xfrm flipH="1">
+            <a:off x="1830266" y="5884307"/>
+            <a:ext cx="5503984" cy="0"/>
+          </a:xfrm>
+          <a:prstGeom prst="line">
+            <a:avLst/>
+          </a:prstGeom>
+          <a:ln w="38100">
+            <a:solidFill>
+              <a:schemeClr val="tx1"/>
+            </a:solidFill>
+          </a:ln>
+        </p:spPr>
+        <p:style>
+          <a:lnRef idx="1">
+            <a:schemeClr val="accent1"/>
+          </a:lnRef>
+          <a:fillRef idx="0">
+            <a:schemeClr val="accent1"/>
+          </a:fillRef>
+          <a:effectRef idx="0">
+            <a:schemeClr val="accent1"/>
+          </a:effectRef>
+          <a:fontRef idx="minor">
+            <a:schemeClr val="tx1"/>
+          </a:fontRef>
+        </p:style>
+      </p:cxnSp>
+      <p:cxnSp>
+        <p:nvCxnSpPr>
+          <p:cNvPr id="14" name="Straight Connector 13"/>
+          <p:cNvCxnSpPr/>
+          <p:nvPr/>
+        </p:nvCxnSpPr>
+        <p:spPr>
+          <a:xfrm flipV="1">
+            <a:off x="1830266" y="397907"/>
+            <a:ext cx="5503984" cy="5486400"/>
+          </a:xfrm>
+          <a:prstGeom prst="line">
+            <a:avLst/>
+          </a:prstGeom>
+          <a:ln w="31750">
+            <a:solidFill>
+              <a:schemeClr val="tx1"/>
+            </a:solidFill>
+            <a:prstDash val="dash"/>
+          </a:ln>
+        </p:spPr>
+        <p:style>
+          <a:lnRef idx="1">
+            <a:schemeClr val="accent1"/>
+          </a:lnRef>
+          <a:fillRef idx="0">
+            <a:schemeClr val="accent1"/>
+          </a:fillRef>
+          <a:effectRef idx="0">
+            <a:schemeClr val="accent1"/>
+          </a:effectRef>
+          <a:fontRef idx="minor">
+            <a:schemeClr val="tx1"/>
+          </a:fontRef>
+        </p:style>
+      </p:cxnSp>
+      <p:cxnSp>
+        <p:nvCxnSpPr>
+          <p:cNvPr id="19" name="Straight Connector 18"/>
+          <p:cNvCxnSpPr/>
+          <p:nvPr/>
+        </p:nvCxnSpPr>
+        <p:spPr>
+          <a:xfrm flipV="1">
+            <a:off x="1830266" y="397907"/>
+            <a:ext cx="2751992" cy="2762250"/>
+          </a:xfrm>
+          <a:prstGeom prst="line">
+            <a:avLst/>
+          </a:prstGeom>
+          <a:ln w="31750">
+            <a:solidFill>
+              <a:schemeClr val="tx1"/>
+            </a:solidFill>
+            <a:prstDash val="dash"/>
+          </a:ln>
+        </p:spPr>
+        <p:style>
+          <a:lnRef idx="1">
+            <a:schemeClr val="accent1"/>
+          </a:lnRef>
+          <a:fillRef idx="0">
+            <a:schemeClr val="accent1"/>
+          </a:fillRef>
+          <a:effectRef idx="0">
+            <a:schemeClr val="accent1"/>
+          </a:effectRef>
+          <a:fontRef idx="minor">
+            <a:schemeClr val="tx1"/>
+          </a:fontRef>
+        </p:style>
+      </p:cxnSp>
+      <p:cxnSp>
+        <p:nvCxnSpPr>
+          <p:cNvPr id="22" name="Straight Connector 21"/>
+          <p:cNvCxnSpPr/>
+          <p:nvPr/>
+        </p:nvCxnSpPr>
+        <p:spPr>
+          <a:xfrm flipV="1">
+            <a:off x="4591783" y="3074432"/>
+            <a:ext cx="2751992" cy="2762250"/>
+          </a:xfrm>
+          <a:prstGeom prst="line">
+            <a:avLst/>
+          </a:prstGeom>
+          <a:ln w="31750">
+            <a:solidFill>
+              <a:schemeClr val="tx1"/>
+            </a:solidFill>
+            <a:prstDash val="dash"/>
+          </a:ln>
+        </p:spPr>
+        <p:style>
+          <a:lnRef idx="1">
+            <a:schemeClr val="accent1"/>
+          </a:lnRef>
+          <a:fillRef idx="0">
+            <a:schemeClr val="accent1"/>
+          </a:fillRef>
+          <a:effectRef idx="0">
+            <a:schemeClr val="accent1"/>
+          </a:effectRef>
+          <a:fontRef idx="minor">
+            <a:schemeClr val="tx1"/>
+          </a:fontRef>
+        </p:style>
+      </p:cxnSp>
+      <p:sp>
+        <p:nvSpPr>
+          <p:cNvPr id="23" name="TextBox 22"/>
+          <p:cNvSpPr txBox="1"/>
+          <p:nvPr/>
+        </p:nvSpPr>
+        <p:spPr>
+          <a:xfrm>
+            <a:off x="1314450" y="257175"/>
+            <a:ext cx="685800" cy="369332"/>
+          </a:xfrm>
+          <a:prstGeom prst="rect">
+            <a:avLst/>
+          </a:prstGeom>
+          <a:noFill/>
+        </p:spPr>
+        <p:txBody>
+          <a:bodyPr wrap="square" rtlCol="0">
+            <a:spAutoFit/>
+          </a:bodyPr>
+          <a:lstStyle/>
+          <a:p>
+            <a:r>
+              <a:rPr lang="en-US" b="1" dirty="0" smtClean="0"/>
+              <a:t>100</a:t>
+            </a:r>
+            <a:endParaRPr lang="en-US" b="1" dirty="0"/>
+          </a:p>
+        </p:txBody>
+      </p:sp>
+      <p:sp>
+        <p:nvSpPr>
+          <p:cNvPr id="24" name="TextBox 23"/>
+          <p:cNvSpPr txBox="1"/>
+          <p:nvPr/>
+        </p:nvSpPr>
+        <p:spPr>
+          <a:xfrm>
+            <a:off x="1390650" y="2956441"/>
+            <a:ext cx="457200" cy="369332"/>
+          </a:xfrm>
+          <a:prstGeom prst="rect">
+            <a:avLst/>
+          </a:prstGeom>
+          <a:noFill/>
+        </p:spPr>
+        <p:txBody>
+          <a:bodyPr wrap="square" rtlCol="0">
+            <a:spAutoFit/>
+          </a:bodyPr>
+          <a:lstStyle/>
+          <a:p>
+            <a:r>
+              <a:rPr lang="en-US" b="1" dirty="0" smtClean="0"/>
+              <a:t>50</a:t>
+            </a:r>
+            <a:endParaRPr lang="en-US" b="1" dirty="0"/>
+          </a:p>
+        </p:txBody>
+      </p:sp>
+      <p:sp>
+        <p:nvSpPr>
+          <p:cNvPr id="25" name="TextBox 24"/>
+          <p:cNvSpPr txBox="1"/>
+          <p:nvPr/>
+        </p:nvSpPr>
+        <p:spPr>
+          <a:xfrm>
+            <a:off x="1543050" y="5821323"/>
+            <a:ext cx="457200" cy="369332"/>
+          </a:xfrm>
+          <a:prstGeom prst="rect">
+            <a:avLst/>
+          </a:prstGeom>
+          <a:noFill/>
+        </p:spPr>
+        <p:txBody>
+          <a:bodyPr wrap="square" rtlCol="0">
+            <a:spAutoFit/>
+          </a:bodyPr>
+          <a:lstStyle/>
+          <a:p>
+            <a:r>
+              <a:rPr lang="en-US" b="1" dirty="0" smtClean="0"/>
+              <a:t>0</a:t>
+            </a:r>
+            <a:endParaRPr lang="en-US" b="1" dirty="0"/>
+          </a:p>
+        </p:txBody>
+      </p:sp>
+      <p:sp>
+        <p:nvSpPr>
+          <p:cNvPr id="26" name="TextBox 25"/>
+          <p:cNvSpPr txBox="1"/>
+          <p:nvPr/>
+        </p:nvSpPr>
+        <p:spPr>
+          <a:xfrm>
+            <a:off x="4382233" y="5868948"/>
+            <a:ext cx="457200" cy="369332"/>
+          </a:xfrm>
+          <a:prstGeom prst="rect">
+            <a:avLst/>
+          </a:prstGeom>
+          <a:noFill/>
+        </p:spPr>
+        <p:txBody>
+          <a:bodyPr wrap="square" rtlCol="0">
+            <a:spAutoFit/>
+          </a:bodyPr>
+          <a:lstStyle/>
+          <a:p>
+            <a:r>
+              <a:rPr lang="en-US" b="1" dirty="0" smtClean="0"/>
+              <a:t>50</a:t>
+            </a:r>
+            <a:endParaRPr lang="en-US" b="1" dirty="0"/>
+          </a:p>
+        </p:txBody>
+      </p:sp>
+      <p:sp>
+        <p:nvSpPr>
+          <p:cNvPr id="27" name="TextBox 26"/>
+          <p:cNvSpPr txBox="1"/>
+          <p:nvPr/>
+        </p:nvSpPr>
+        <p:spPr>
+          <a:xfrm>
+            <a:off x="7181850" y="5884307"/>
+            <a:ext cx="685800" cy="369332"/>
+          </a:xfrm>
+          <a:prstGeom prst="rect">
+            <a:avLst/>
+          </a:prstGeom>
+          <a:noFill/>
+        </p:spPr>
+        <p:txBody>
+          <a:bodyPr wrap="square" rtlCol="0">
+            <a:spAutoFit/>
+          </a:bodyPr>
+          <a:lstStyle/>
+          <a:p>
+            <a:r>
+              <a:rPr lang="en-US" b="1" dirty="0" smtClean="0"/>
+              <a:t>100</a:t>
+            </a:r>
+            <a:endParaRPr lang="en-US" b="1" dirty="0"/>
+          </a:p>
+        </p:txBody>
+      </p:sp>
+      <p:sp>
+        <p:nvSpPr>
+          <p:cNvPr id="28" name="TextBox 27"/>
+          <p:cNvSpPr txBox="1"/>
+          <p:nvPr/>
+        </p:nvSpPr>
+        <p:spPr>
+          <a:xfrm>
+            <a:off x="7248525" y="152400"/>
+            <a:ext cx="1219200" cy="369332"/>
+          </a:xfrm>
+          <a:prstGeom prst="rect">
+            <a:avLst/>
+          </a:prstGeom>
+          <a:noFill/>
+        </p:spPr>
+        <p:txBody>
+          <a:bodyPr wrap="square" rtlCol="0">
+            <a:spAutoFit/>
+          </a:bodyPr>
+          <a:lstStyle/>
+          <a:p>
+            <a:r>
+              <a:rPr lang="en-US" b="1" dirty="0" smtClean="0"/>
+              <a:t>1:1</a:t>
+            </a:r>
+            <a:endParaRPr lang="en-US" b="1" dirty="0"/>
+          </a:p>
+        </p:txBody>
+      </p:sp>
+      <p:sp>
+        <p:nvSpPr>
+          <p:cNvPr id="29" name="Isosceles Triangle 28"/>
+          <p:cNvSpPr/>
+          <p:nvPr/>
+        </p:nvSpPr>
+        <p:spPr>
+          <a:xfrm rot="5400000">
+            <a:off x="1884485" y="376662"/>
+            <a:ext cx="2666999" cy="2709496"/>
+          </a:xfrm>
+          <a:prstGeom prst="triangle">
+            <a:avLst>
+              <a:gd name="adj" fmla="val 0"/>
+            </a:avLst>
+          </a:prstGeom>
+          <a:solidFill>
+            <a:schemeClr val="bg1">
+              <a:lumMod val="85000"/>
+            </a:schemeClr>
+          </a:solidFill>
+          <a:ln>
+            <a:noFill/>
+          </a:ln>
+        </p:spPr>
+        <p:style>
+          <a:lnRef idx="2">
+            <a:schemeClr val="accent1">
+              <a:shade val="50000"/>
+            </a:schemeClr>
+          </a:lnRef>
+          <a:fillRef idx="1">
+            <a:schemeClr val="accent1"/>
+          </a:fillRef>
+          <a:effectRef idx="0">
+            <a:schemeClr val="accent1"/>
+          </a:effectRef>
+          <a:fontRef idx="minor">
+            <a:schemeClr val="lt1"/>
+          </a:fontRef>
+        </p:style>
+        <p:txBody>
+          <a:bodyPr rtlCol="0" anchor="ctr"/>
+          <a:lstStyle/>
+          <a:p>
+            <a:pPr algn="ctr"/>
+            <a:endParaRPr lang="en-US"/>
+          </a:p>
+        </p:txBody>
+      </p:sp>
+      <p:sp>
+        <p:nvSpPr>
+          <p:cNvPr id="30" name="Isosceles Triangle 29"/>
+          <p:cNvSpPr/>
+          <p:nvPr/>
+        </p:nvSpPr>
+        <p:spPr>
+          <a:xfrm rot="16200000">
+            <a:off x="4669449" y="3148434"/>
+            <a:ext cx="2666999" cy="2709496"/>
+          </a:xfrm>
+          <a:prstGeom prst="triangle">
+            <a:avLst>
+              <a:gd name="adj" fmla="val 0"/>
+            </a:avLst>
+          </a:prstGeom>
+          <a:solidFill>
+            <a:schemeClr val="bg1">
+              <a:lumMod val="85000"/>
+            </a:schemeClr>
+          </a:solidFill>
+          <a:ln>
+            <a:noFill/>
+          </a:ln>
+        </p:spPr>
+        <p:style>
+          <a:lnRef idx="2">
+            <a:schemeClr val="accent1">
+              <a:shade val="50000"/>
+            </a:schemeClr>
+          </a:lnRef>
+          <a:fillRef idx="1">
+            <a:schemeClr val="accent1"/>
+          </a:fillRef>
+          <a:effectRef idx="0">
+            <a:schemeClr val="accent1"/>
+          </a:effectRef>
+          <a:fontRef idx="minor">
+            <a:schemeClr val="lt1"/>
+          </a:fontRef>
+        </p:style>
+        <p:txBody>
+          <a:bodyPr rtlCol="0" anchor="ctr"/>
+          <a:lstStyle/>
+          <a:p>
+            <a:pPr algn="ctr"/>
+            <a:endParaRPr lang="en-US"/>
+          </a:p>
+        </p:txBody>
+      </p:sp>
+      <p:sp>
+        <p:nvSpPr>
+          <p:cNvPr id="31" name="TextBox 30"/>
+          <p:cNvSpPr txBox="1"/>
+          <p:nvPr/>
+        </p:nvSpPr>
+        <p:spPr>
+          <a:xfrm>
+            <a:off x="2000250" y="866775"/>
+            <a:ext cx="1371600" cy="369332"/>
+          </a:xfrm>
+          <a:prstGeom prst="rect">
+            <a:avLst/>
+          </a:prstGeom>
+          <a:noFill/>
+        </p:spPr>
+        <p:txBody>
+          <a:bodyPr wrap="square" rtlCol="0">
+            <a:spAutoFit/>
+          </a:bodyPr>
+          <a:lstStyle/>
+          <a:p>
+            <a:pPr algn="ctr"/>
+            <a:r>
+              <a:rPr lang="en-US" b="1" dirty="0" smtClean="0"/>
+              <a:t>FP State</a:t>
+            </a:r>
+            <a:endParaRPr lang="en-US" b="1" dirty="0"/>
+          </a:p>
+        </p:txBody>
+      </p:sp>
+      <p:sp>
+        <p:nvSpPr>
+          <p:cNvPr id="32" name="TextBox 31"/>
+          <p:cNvSpPr txBox="1"/>
+          <p:nvPr/>
+        </p:nvSpPr>
+        <p:spPr>
+          <a:xfrm>
+            <a:off x="5810250" y="4969907"/>
+            <a:ext cx="1371600" cy="369332"/>
+          </a:xfrm>
+          <a:prstGeom prst="rect">
+            <a:avLst/>
+          </a:prstGeom>
+          <a:noFill/>
+        </p:spPr>
+        <p:txBody>
+          <a:bodyPr wrap="square" rtlCol="0">
+            <a:spAutoFit/>
+          </a:bodyPr>
+          <a:lstStyle/>
+          <a:p>
+            <a:pPr algn="ctr"/>
+            <a:r>
+              <a:rPr lang="en-US" b="1" dirty="0" smtClean="0"/>
+              <a:t>SAV State</a:t>
+            </a:r>
+            <a:endParaRPr lang="en-US" b="1" dirty="0"/>
+          </a:p>
+        </p:txBody>
+      </p:sp>
+      <p:sp>
+        <p:nvSpPr>
+          <p:cNvPr id="33" name="TextBox 32"/>
+          <p:cNvSpPr txBox="1"/>
+          <p:nvPr/>
+        </p:nvSpPr>
+        <p:spPr>
+          <a:xfrm>
+            <a:off x="3905250" y="2950607"/>
+            <a:ext cx="1371600" cy="369332"/>
+          </a:xfrm>
+          <a:prstGeom prst="rect">
+            <a:avLst/>
+          </a:prstGeom>
+          <a:noFill/>
+        </p:spPr>
+        <p:txBody>
+          <a:bodyPr wrap="square" rtlCol="0">
+            <a:spAutoFit/>
+          </a:bodyPr>
+          <a:lstStyle/>
+          <a:p>
+            <a:pPr algn="ctr"/>
+            <a:r>
+              <a:rPr lang="en-US" b="1" dirty="0" smtClean="0"/>
+              <a:t>Mixed</a:t>
+            </a:r>
+            <a:endParaRPr lang="en-US" b="1" dirty="0"/>
+          </a:p>
+        </p:txBody>
+      </p:sp>
+      <p:sp>
+        <p:nvSpPr>
+          <p:cNvPr id="34" name="TextBox 33"/>
+          <p:cNvSpPr txBox="1"/>
+          <p:nvPr/>
+        </p:nvSpPr>
+        <p:spPr>
+          <a:xfrm rot="16200000">
+            <a:off x="-1627345" y="2944656"/>
+            <a:ext cx="5383823" cy="461665"/>
+          </a:xfrm>
+          <a:prstGeom prst="rect">
+            <a:avLst/>
+          </a:prstGeom>
+          <a:noFill/>
+        </p:spPr>
+        <p:txBody>
+          <a:bodyPr wrap="square" rtlCol="0">
+            <a:spAutoFit/>
+          </a:bodyPr>
+          <a:lstStyle/>
+          <a:p>
+            <a:pPr algn="ctr"/>
+            <a:r>
+              <a:rPr lang="en-US" sz="2400" b="1" dirty="0" smtClean="0"/>
+              <a:t>Floating plant cover (%)</a:t>
+            </a:r>
+            <a:endParaRPr lang="en-US" sz="2400" b="1" dirty="0"/>
+          </a:p>
+        </p:txBody>
+      </p:sp>
+      <p:sp>
+        <p:nvSpPr>
+          <p:cNvPr id="36" name="TextBox 35"/>
+          <p:cNvSpPr txBox="1"/>
+          <p:nvPr/>
+        </p:nvSpPr>
+        <p:spPr>
+          <a:xfrm>
+            <a:off x="1883752" y="6253639"/>
+            <a:ext cx="5383823" cy="461665"/>
+          </a:xfrm>
+          <a:prstGeom prst="rect">
+            <a:avLst/>
+          </a:prstGeom>
+          <a:noFill/>
+        </p:spPr>
+        <p:txBody>
+          <a:bodyPr wrap="square" rtlCol="0">
+            <a:spAutoFit/>
+          </a:bodyPr>
+          <a:lstStyle/>
+          <a:p>
+            <a:pPr algn="ctr"/>
+            <a:r>
+              <a:rPr lang="en-US" sz="2400" b="1" smtClean="0"/>
+              <a:t>Submerged plant </a:t>
+            </a:r>
+            <a:r>
+              <a:rPr lang="en-US" sz="2400" b="1" dirty="0" smtClean="0"/>
+              <a:t>cover (%)</a:t>
+            </a:r>
+            <a:endParaRPr lang="en-US" sz="2400" b="1" dirty="0"/>
+          </a:p>
+        </p:txBody>
+      </p:sp>
+      <p:cxnSp>
+        <p:nvCxnSpPr>
+          <p:cNvPr id="21" name="Straight Connector 20"/>
+          <p:cNvCxnSpPr/>
+          <p:nvPr/>
+        </p:nvCxnSpPr>
+        <p:spPr>
+          <a:xfrm>
+            <a:off x="3505200" y="1533525"/>
+            <a:ext cx="1295400" cy="1362075"/>
+          </a:xfrm>
+          <a:prstGeom prst="line">
+            <a:avLst/>
+          </a:prstGeom>
+          <a:ln w="25400"/>
+        </p:spPr>
+        <p:style>
+          <a:lnRef idx="1">
+            <a:schemeClr val="accent1"/>
+          </a:lnRef>
+          <a:fillRef idx="0">
+            <a:schemeClr val="accent1"/>
+          </a:fillRef>
+          <a:effectRef idx="0">
+            <a:schemeClr val="accent1"/>
+          </a:effectRef>
+          <a:fontRef idx="minor">
+            <a:schemeClr val="tx1"/>
+          </a:fontRef>
+        </p:style>
+      </p:cxnSp>
+      <p:sp>
+        <p:nvSpPr>
+          <p:cNvPr id="3" name="TextBox 2"/>
+          <p:cNvSpPr txBox="1"/>
+          <p:nvPr/>
+        </p:nvSpPr>
+        <p:spPr>
+          <a:xfrm>
+            <a:off x="3886200" y="1688068"/>
+            <a:ext cx="1371600" cy="369332"/>
+          </a:xfrm>
+          <a:prstGeom prst="rect">
+            <a:avLst/>
+          </a:prstGeom>
+          <a:noFill/>
+        </p:spPr>
+        <p:txBody>
+          <a:bodyPr wrap="square" rtlCol="0">
+            <a:spAutoFit/>
+          </a:bodyPr>
+          <a:lstStyle/>
+          <a:p>
+            <a:r>
+              <a:rPr lang="en-US" b="1" dirty="0" smtClean="0"/>
+              <a:t>50 / </a:t>
+            </a:r>
+            <a:r>
+              <a:rPr lang="en-US" b="1" dirty="0" err="1" smtClean="0"/>
+              <a:t>sqrt</a:t>
+            </a:r>
+            <a:r>
+              <a:rPr lang="en-US" b="1" dirty="0" smtClean="0"/>
+              <a:t>(2)</a:t>
+            </a:r>
+            <a:endParaRPr lang="en-US" b="1" dirty="0"/>
+          </a:p>
+        </p:txBody>
+      </p:sp>
+    </p:spTree>
+    <p:extLst>
+      <p:ext uri="{BB962C8B-B14F-4D97-AF65-F5344CB8AC3E}">
+        <p14:creationId xmlns:p14="http://schemas.microsoft.com/office/powerpoint/2010/main" val="4026240780"/>
+      </p:ext>
+    </p:extLst>
+  </p:cSld>
+  <p:clrMapOvr>
+    <a:masterClrMapping/>
+  </p:clrMapOvr>
+  <p:timing>
+    <p:tnLst>
+      <p:par>
+        <p:cTn id="1" dur="indefinite" restart="never" nodeType="tmRoot"/>
+      </p:par>
+    </p:tnLst>
+  </p:timing>
 </p:sld>
 </file>
 

</xml_diff>